<commit_message>
Update ERG3010 Group 10 Presentation.pptx
</commit_message>
<xml_diff>
--- a/presentation/ERG3010 Group 10 Presentation.pptx
+++ b/presentation/ERG3010 Group 10 Presentation.pptx
@@ -5446,13 +5446,13 @@
   <p:clrMapOvr>
     <a:masterClrMapping/>
   </p:clrMapOvr>
-  <mc:AlternateContent xmlns:mc="http://schemas.openxmlformats.org/markup-compatibility/2006">
-    <mc:Choice xmlns:p14="http://schemas.microsoft.com/office/powerpoint/2010/main" Requires="p14">
+  <mc:AlternateContent xmlns:mc="http://schemas.openxmlformats.org/markup-compatibility/2006" xmlns:p14="http://schemas.microsoft.com/office/powerpoint/2010/main">
+    <mc:Choice Requires="p14">
       <p:transition spd="med" p14:dur="700" advClick="0" advTm="6355">
         <p:fade/>
       </p:transition>
     </mc:Choice>
-    <mc:Fallback>
+    <mc:Fallback xmlns="">
       <p:transition spd="med" advClick="0" advTm="6355">
         <p:fade/>
       </p:transition>
@@ -6451,13 +6451,13 @@
   <p:clrMapOvr>
     <a:masterClrMapping/>
   </p:clrMapOvr>
-  <mc:AlternateContent xmlns:mc="http://schemas.openxmlformats.org/markup-compatibility/2006">
-    <mc:Choice xmlns:p14="http://schemas.microsoft.com/office/powerpoint/2010/main" Requires="p14">
+  <mc:AlternateContent xmlns:mc="http://schemas.openxmlformats.org/markup-compatibility/2006" xmlns:p14="http://schemas.microsoft.com/office/powerpoint/2010/main">
+    <mc:Choice Requires="p14">
       <p:transition spd="med" p14:dur="700" advClick="0" advTm="3000">
         <p:fade/>
       </p:transition>
     </mc:Choice>
-    <mc:Fallback>
+    <mc:Fallback xmlns="">
       <p:transition spd="med" advClick="0" advTm="3000">
         <p:fade/>
       </p:transition>
@@ -7063,7 +7063,7 @@
           <p:nvPr>
             <p:extLst>
               <p:ext uri="{D42A27DB-BD31-4B8C-83A1-F6EECF244321}">
-                <p14:modId xmlns:p14="http://schemas.microsoft.com/office/powerpoint/2010/main" val="1468900014"/>
+                <p14:modId xmlns:p14="http://schemas.microsoft.com/office/powerpoint/2010/main" val="2770421008"/>
               </p:ext>
             </p:extLst>
           </p:nvPr>
@@ -7195,7 +7195,15 @@
                       <a:pPr algn="ctr"/>
                       <a:r>
                         <a:rPr lang="en-US" altLang="zh-CN" sz="2000" dirty="0"/>
-                        <a:t>Web interface design; Front-end. Front- and back-end frame construction </a:t>
+                        <a:t>Front-end</a:t>
+                      </a:r>
+                      <a:r>
+                        <a:rPr lang="zh-CN" altLang="en-US" sz="2000" dirty="0"/>
+                        <a:t> </a:t>
+                      </a:r>
+                      <a:r>
+                        <a:rPr lang="en-US" altLang="zh-CN" sz="2000" dirty="0"/>
+                        <a:t>Web interface design; Front- and back-end frame construction </a:t>
                       </a:r>
                       <a:endParaRPr lang="zh-CN" altLang="en-US" sz="2000" dirty="0"/>
                     </a:p>
@@ -7258,7 +7266,15 @@
                       <a:pPr algn="ctr"/>
                       <a:r>
                         <a:rPr lang="en-US" altLang="zh-CN" sz="2000" dirty="0"/>
-                        <a:t>Functions implementation; Back-end. Front- and back-end frame construction </a:t>
+                        <a:t>Back-end</a:t>
+                      </a:r>
+                      <a:r>
+                        <a:rPr lang="zh-CN" altLang="en-US" sz="2000" dirty="0"/>
+                        <a:t> </a:t>
+                      </a:r>
+                      <a:r>
+                        <a:rPr lang="en-US" altLang="zh-CN" sz="2000" dirty="0"/>
+                        <a:t>Functions implementation; Front- and back-end frame construction </a:t>
                       </a:r>
                       <a:endParaRPr lang="zh-CN" altLang="en-US" sz="2000" dirty="0"/>
                     </a:p>
@@ -7317,26 +7333,10 @@
                     <a:bodyPr/>
                     <a:lstStyle/>
                     <a:p>
-                      <a:pPr marL="0" marR="0" lvl="0" indent="0" algn="ctr" defTabSz="914400" rtl="0" eaLnBrk="1" fontAlgn="auto" latinLnBrk="0" hangingPunct="1">
-                        <a:lnSpc>
-                          <a:spcPct val="100000"/>
-                        </a:lnSpc>
-                        <a:spcBef>
-                          <a:spcPts val="0"/>
-                        </a:spcBef>
-                        <a:spcAft>
-                          <a:spcPts val="0"/>
-                        </a:spcAft>
-                        <a:buClrTx/>
-                        <a:buSzTx/>
-                        <a:buFontTx/>
-                        <a:buNone/>
-                        <a:tabLst/>
-                        <a:defRPr/>
-                      </a:pPr>
+                      <a:pPr algn="ctr"/>
                       <a:r>
                         <a:rPr lang="en-US" altLang="zh-CN" sz="2000" dirty="0"/>
-                        <a:t>Functions implementation; Back-end;</a:t>
+                        <a:t>Back-end</a:t>
                       </a:r>
                       <a:r>
                         <a:rPr lang="zh-CN" altLang="en-US" sz="2000" dirty="0"/>
@@ -7344,7 +7344,7 @@
                       </a:r>
                       <a:r>
                         <a:rPr lang="en-US" altLang="zh-CN" sz="2000" dirty="0"/>
-                        <a:t>Assisting Front-end</a:t>
+                        <a:t>Functions implementation; Front- and back-end frame construction </a:t>
                       </a:r>
                       <a:endParaRPr lang="zh-CN" altLang="en-US" sz="2000" dirty="0"/>
                     </a:p>
@@ -7406,7 +7406,15 @@
                       <a:pPr algn="ctr"/>
                       <a:r>
                         <a:rPr lang="en-US" altLang="zh-CN" sz="2000" dirty="0"/>
-                        <a:t>Data collection and preprocessing; Database construction; Assisting Front-end</a:t>
+                        <a:t>Data collection and preprocessing; Database construction; Front-end</a:t>
+                      </a:r>
+                      <a:r>
+                        <a:rPr lang="zh-CN" altLang="en-US" sz="2000" dirty="0"/>
+                        <a:t> </a:t>
+                      </a:r>
+                      <a:r>
+                        <a:rPr lang="en-US" altLang="zh-CN" sz="2000" dirty="0"/>
+                        <a:t>Web interface design</a:t>
                       </a:r>
                       <a:endParaRPr lang="zh-CN" altLang="en-US" sz="2000" dirty="0"/>
                     </a:p>
@@ -7468,7 +7476,27 @@
                       <a:pPr algn="ctr"/>
                       <a:r>
                         <a:rPr lang="en-US" altLang="zh-CN" sz="2000" dirty="0"/>
-                        <a:t>Schema design; Data analysis and visualization; Assisting Front-end; PPT Preparation</a:t>
+                        <a:t>Schema design; Data analysis and machine</a:t>
+                      </a:r>
+                      <a:r>
+                        <a:rPr lang="zh-CN" altLang="en-US" sz="2000" dirty="0"/>
+                        <a:t> </a:t>
+                      </a:r>
+                      <a:r>
+                        <a:rPr lang="en-US" altLang="zh-CN" sz="2000" dirty="0"/>
+                        <a:t>learning</a:t>
+                      </a:r>
+                      <a:r>
+                        <a:rPr lang="zh-CN" altLang="en-US" sz="2000" dirty="0"/>
+                        <a:t> </a:t>
+                      </a:r>
+                      <a:r>
+                        <a:rPr lang="en-US" altLang="zh-CN" sz="2000"/>
+                        <a:t>implementation; </a:t>
+                      </a:r>
+                      <a:r>
+                        <a:rPr lang="en-US" altLang="zh-CN" sz="2000" dirty="0"/>
+                        <a:t>PPT Preparation</a:t>
                       </a:r>
                       <a:endParaRPr lang="zh-CN" altLang="en-US" sz="2000" dirty="0"/>
                     </a:p>
@@ -7495,13 +7523,13 @@
   <p:clrMapOvr>
     <a:masterClrMapping/>
   </p:clrMapOvr>
-  <mc:AlternateContent xmlns:mc="http://schemas.openxmlformats.org/markup-compatibility/2006">
-    <mc:Choice xmlns:p14="http://schemas.microsoft.com/office/powerpoint/2010/main" Requires="p14">
+  <mc:AlternateContent xmlns:mc="http://schemas.openxmlformats.org/markup-compatibility/2006" xmlns:p14="http://schemas.microsoft.com/office/powerpoint/2010/main">
+    <mc:Choice Requires="p14">
       <p:transition spd="med" p14:dur="700" advClick="0" advTm="3000">
         <p:fade/>
       </p:transition>
     </mc:Choice>
-    <mc:Fallback>
+    <mc:Fallback xmlns="">
       <p:transition spd="med" advClick="0" advTm="3000">
         <p:fade/>
       </p:transition>
@@ -8718,13 +8746,13 @@
   <p:clrMapOvr>
     <a:masterClrMapping/>
   </p:clrMapOvr>
-  <mc:AlternateContent xmlns:mc="http://schemas.openxmlformats.org/markup-compatibility/2006">
-    <mc:Choice xmlns:p14="http://schemas.microsoft.com/office/powerpoint/2010/main" Requires="p14">
+  <mc:AlternateContent xmlns:mc="http://schemas.openxmlformats.org/markup-compatibility/2006" xmlns:p14="http://schemas.microsoft.com/office/powerpoint/2010/main">
+    <mc:Choice Requires="p14">
       <p:transition spd="med" p14:dur="700" advClick="0" advTm="3000">
         <p:fade/>
       </p:transition>
     </mc:Choice>
-    <mc:Fallback>
+    <mc:Fallback xmlns="">
       <p:transition spd="med" advClick="0" advTm="3000">
         <p:fade/>
       </p:transition>
@@ -9458,13 +9486,13 @@
   <p:clrMapOvr>
     <a:masterClrMapping/>
   </p:clrMapOvr>
-  <mc:AlternateContent xmlns:mc="http://schemas.openxmlformats.org/markup-compatibility/2006">
-    <mc:Choice xmlns:p14="http://schemas.microsoft.com/office/powerpoint/2010/main" Requires="p14">
+  <mc:AlternateContent xmlns:mc="http://schemas.openxmlformats.org/markup-compatibility/2006" xmlns:p14="http://schemas.microsoft.com/office/powerpoint/2010/main">
+    <mc:Choice Requires="p14">
       <p:transition spd="med" p14:dur="700" advClick="0" advTm="3000">
         <p:fade/>
       </p:transition>
     </mc:Choice>
-    <mc:Fallback>
+    <mc:Fallback xmlns="">
       <p:transition spd="med" advClick="0" advTm="3000">
         <p:fade/>
       </p:transition>
@@ -10107,13 +10135,13 @@
   <p:clrMapOvr>
     <a:masterClrMapping/>
   </p:clrMapOvr>
-  <mc:AlternateContent xmlns:mc="http://schemas.openxmlformats.org/markup-compatibility/2006">
-    <mc:Choice xmlns:p14="http://schemas.microsoft.com/office/powerpoint/2010/main" Requires="p14">
+  <mc:AlternateContent xmlns:mc="http://schemas.openxmlformats.org/markup-compatibility/2006" xmlns:p14="http://schemas.microsoft.com/office/powerpoint/2010/main">
+    <mc:Choice Requires="p14">
       <p:transition spd="med" p14:dur="700" advClick="0" advTm="3000">
         <p:fade/>
       </p:transition>
     </mc:Choice>
-    <mc:Fallback>
+    <mc:Fallback xmlns="">
       <p:transition spd="med" advClick="0" advTm="3000">
         <p:fade/>
       </p:transition>
@@ -10752,13 +10780,13 @@
   <p:clrMapOvr>
     <a:masterClrMapping/>
   </p:clrMapOvr>
-  <mc:AlternateContent xmlns:mc="http://schemas.openxmlformats.org/markup-compatibility/2006">
-    <mc:Choice xmlns:p14="http://schemas.microsoft.com/office/powerpoint/2010/main" Requires="p14">
+  <mc:AlternateContent xmlns:mc="http://schemas.openxmlformats.org/markup-compatibility/2006" xmlns:p14="http://schemas.microsoft.com/office/powerpoint/2010/main">
+    <mc:Choice Requires="p14">
       <p:transition spd="med" p14:dur="700" advClick="0" advTm="3000">
         <p:fade/>
       </p:transition>
     </mc:Choice>
-    <mc:Fallback>
+    <mc:Fallback xmlns="">
       <p:transition spd="med" advClick="0" advTm="3000">
         <p:fade/>
       </p:transition>
@@ -11172,13 +11200,13 @@
   <p:clrMapOvr>
     <a:masterClrMapping/>
   </p:clrMapOvr>
-  <mc:AlternateContent xmlns:mc="http://schemas.openxmlformats.org/markup-compatibility/2006">
-    <mc:Choice xmlns:p14="http://schemas.microsoft.com/office/powerpoint/2010/main" Requires="p14">
+  <mc:AlternateContent xmlns:mc="http://schemas.openxmlformats.org/markup-compatibility/2006" xmlns:p14="http://schemas.microsoft.com/office/powerpoint/2010/main">
+    <mc:Choice Requires="p14">
       <p:transition spd="med" p14:dur="700" advClick="0" advTm="3000">
         <p:fade/>
       </p:transition>
     </mc:Choice>
-    <mc:Fallback>
+    <mc:Fallback xmlns="">
       <p:transition spd="med" advClick="0" advTm="3000">
         <p:fade/>
       </p:transition>
@@ -11918,13 +11946,13 @@
   <p:clrMapOvr>
     <a:masterClrMapping/>
   </p:clrMapOvr>
-  <mc:AlternateContent xmlns:mc="http://schemas.openxmlformats.org/markup-compatibility/2006">
-    <mc:Choice xmlns:p14="http://schemas.microsoft.com/office/powerpoint/2010/main" Requires="p14">
+  <mc:AlternateContent xmlns:mc="http://schemas.openxmlformats.org/markup-compatibility/2006" xmlns:p14="http://schemas.microsoft.com/office/powerpoint/2010/main">
+    <mc:Choice Requires="p14">
       <p:transition spd="med" p14:dur="700" advClick="0" advTm="3000">
         <p:fade/>
       </p:transition>
     </mc:Choice>
-    <mc:Fallback>
+    <mc:Fallback xmlns="">
       <p:transition spd="med" advClick="0" advTm="3000">
         <p:fade/>
       </p:transition>

</xml_diff>